<commit_message>
[L2S20-116] #time 2h Added the connection to the TwinSrv to the FIFO method.
</commit_message>
<xml_diff>
--- a/eapli.base/docs/1191419/US9002/US9002PP.pptx
+++ b/eapli.base/docs/1191419/US9002/US9002PP.pptx
@@ -233,7 +233,7 @@
             <a:pPr rtl="0"/>
             <a:fld id="{CD24227C-3F79-4894-AF29-54EEA2F15D74}" type="datetime1">
               <a:rPr lang="pt-PT" smtClean="0"/>
-              <a:t>17/06/2022</a:t>
+              <a:t>18/06/2022</a:t>
             </a:fld>
             <a:endParaRPr lang="pt-PT"/>
           </a:p>
@@ -415,7 +415,7 @@
             <a:pPr rtl="0"/>
             <a:fld id="{C3A83782-9536-4DB3-B57F-39CC12543AF1}" type="datetime1">
               <a:rPr lang="pt-PT" smtClean="0"/>
-              <a:t>17/06/2022</a:t>
+              <a:t>18/06/2022</a:t>
             </a:fld>
             <a:endParaRPr lang="pt-PT"/>
           </a:p>
@@ -783,7 +783,7 @@
             <a:pPr rtl="0"/>
             <a:fld id="{53D44CF9-213B-4D28-B0A4-B7B434E666D1}" type="datetime1">
               <a:rPr lang="pt-PT" smtClean="0"/>
-              <a:t>17/06/2022</a:t>
+              <a:t>18/06/2022</a:t>
             </a:fld>
             <a:endParaRPr lang="pt-PT"/>
           </a:p>
@@ -899,7 +899,7 @@
             <a:pPr rtl="0"/>
             <a:fld id="{F7927A80-0518-495D-975A-9D7938BC7105}" type="datetime1">
               <a:rPr lang="pt-PT" smtClean="0"/>
-              <a:t>17/06/2022</a:t>
+              <a:t>18/06/2022</a:t>
             </a:fld>
             <a:endParaRPr lang="pt-PT"/>
           </a:p>
@@ -1015,7 +1015,7 @@
             <a:pPr rtl="0"/>
             <a:fld id="{13411083-A9F7-4F08-90CE-118CFAE51AF2}" type="datetime1">
               <a:rPr lang="pt-PT" smtClean="0"/>
-              <a:t>17/06/2022</a:t>
+              <a:t>18/06/2022</a:t>
             </a:fld>
             <a:endParaRPr lang="pt-PT"/>
           </a:p>
@@ -15769,75 +15769,6 @@
       </p:sp>
       <p:sp>
         <p:nvSpPr>
-          <p:cNvPr id="4" name="Marcador de Posição da Data 3">
-            <a:extLst>
-              <a:ext uri="{FF2B5EF4-FFF2-40B4-BE49-F238E27FC236}">
-                <a16:creationId xmlns:a16="http://schemas.microsoft.com/office/drawing/2014/main" id="{E39EF484-38C8-4EDC-ACF5-695CFB216839}"/>
-              </a:ext>
-            </a:extLst>
-          </p:cNvPr>
-          <p:cNvSpPr>
-            <a:spLocks noGrp="1"/>
-          </p:cNvSpPr>
-          <p:nvPr>
-            <p:ph type="dt" sz="half" idx="10"/>
-          </p:nvPr>
-        </p:nvSpPr>
-        <p:spPr>
-          <a:xfrm>
-            <a:off x="550863" y="6507212"/>
-            <a:ext cx="2628900" cy="153888"/>
-          </a:xfrm>
-        </p:spPr>
-        <p:txBody>
-          <a:bodyPr rtlCol="0"/>
-          <a:lstStyle/>
-          <a:p>
-            <a:pPr rtl="0"/>
-            <a:r>
-              <a:rPr lang="pt-PT"/>
-              <a:t>Terça-feira, 2 de fevereiro de 20XX</a:t>
-            </a:r>
-            <a:endParaRPr lang="pt-PT" dirty="0"/>
-          </a:p>
-        </p:txBody>
-      </p:sp>
-      <p:sp>
-        <p:nvSpPr>
-          <p:cNvPr id="5" name="Marcador de Posição do Rodapé 4">
-            <a:extLst>
-              <a:ext uri="{FF2B5EF4-FFF2-40B4-BE49-F238E27FC236}">
-                <a16:creationId xmlns:a16="http://schemas.microsoft.com/office/drawing/2014/main" id="{AFD183D7-B16E-4A9D-BC4B-D1EC347BF97E}"/>
-              </a:ext>
-            </a:extLst>
-          </p:cNvPr>
-          <p:cNvSpPr>
-            <a:spLocks noGrp="1"/>
-          </p:cNvSpPr>
-          <p:nvPr>
-            <p:ph type="ftr" sz="quarter" idx="11"/>
-          </p:nvPr>
-        </p:nvSpPr>
-        <p:spPr>
-          <a:xfrm>
-            <a:off x="3359150" y="6507212"/>
-            <a:ext cx="6379210" cy="153888"/>
-          </a:xfrm>
-        </p:spPr>
-        <p:txBody>
-          <a:bodyPr rtlCol="0"/>
-          <a:lstStyle/>
-          <a:p>
-            <a:pPr rtl="0"/>
-            <a:r>
-              <a:rPr lang="pt-PT"/>
-              <a:t>Texto de Rodapé de Exemplo</a:t>
-            </a:r>
-          </a:p>
-        </p:txBody>
-      </p:sp>
-      <p:sp>
-        <p:nvSpPr>
           <p:cNvPr id="6" name="Marcador de Posição do Número do Diapositivo 5">
             <a:extLst>
               <a:ext uri="{FF2B5EF4-FFF2-40B4-BE49-F238E27FC236}">
@@ -15896,8 +15827,8 @@
         </p:blipFill>
         <p:spPr>
           <a:xfrm>
-            <a:off x="2777203" y="1364889"/>
-            <a:ext cx="6637595" cy="4679085"/>
+            <a:off x="2536773" y="1301455"/>
+            <a:ext cx="7384714" cy="5205757"/>
           </a:xfrm>
         </p:spPr>
       </p:pic>
@@ -16899,6 +16830,34 @@
 </file>
 
 <file path=customXml/item1.xml><?xml version="1.0" encoding="utf-8"?>
+<?mso-contentType ?>
+<FormTemplates xmlns="http://schemas.microsoft.com/sharepoint/v3/contenttype/forms">
+  <Display>DocumentLibraryForm</Display>
+  <Edit>DocumentLibraryForm</Edit>
+  <New>DocumentLibraryForm</New>
+</FormTemplates>
+</file>
+
+<file path=customXml/item2.xml><?xml version="1.0" encoding="utf-8"?>
+<p:properties xmlns:p="http://schemas.microsoft.com/office/2006/metadata/properties" xmlns:xsi="http://www.w3.org/2001/XMLSchema-instance" xmlns:pc="http://schemas.microsoft.com/office/infopath/2007/PartnerControls">
+  <documentManagement>
+    <_ip_UnifiedCompliancePolicyUIAction xmlns="http://schemas.microsoft.com/sharepoint/v3" xsi:nil="true"/>
+    <Image xmlns="71af3243-3dd4-4a8d-8c0d-dd76da1f02a5">
+      <Url xsi:nil="true"/>
+      <Description xsi:nil="true"/>
+    </Image>
+    <Status xmlns="71af3243-3dd4-4a8d-8c0d-dd76da1f02a5">Not started</Status>
+    <_ip_UnifiedCompliancePolicyProperties xmlns="http://schemas.microsoft.com/sharepoint/v3" xsi:nil="true"/>
+    <lcf76f155ced4ddcb4097134ff3c332f xmlns="71af3243-3dd4-4a8d-8c0d-dd76da1f02a5">
+      <Terms xmlns="http://schemas.microsoft.com/office/infopath/2007/PartnerControls"/>
+    </lcf76f155ced4ddcb4097134ff3c332f>
+    <TaxCatchAll xmlns="230e9df3-be65-4c73-a93b-d1236ebd677e"/>
+    <MediaServiceKeyPoints xmlns="71af3243-3dd4-4a8d-8c0d-dd76da1f02a5" xsi:nil="true"/>
+  </documentManagement>
+</p:properties>
+</file>
+
+<file path=customXml/item3.xml><?xml version="1.0" encoding="utf-8"?>
 <ct:contentTypeSchema xmlns:ct="http://schemas.microsoft.com/office/2006/metadata/contentType" xmlns:ma="http://schemas.microsoft.com/office/2006/metadata/properties/metaAttributes" ct:_="" ma:_="" ma:contentTypeName="Document" ma:contentTypeID="0x01010079F111ED35F8CC479449609E8A0923A6" ma:contentTypeVersion="18" ma:contentTypeDescription="Create a new document." ma:contentTypeScope="" ma:versionID="22a266b9fa9a230c5a512669d8b298c3">
   <xsd:schema xmlns:xsd="http://www.w3.org/2001/XMLSchema" xmlns:xs="http://www.w3.org/2001/XMLSchema" xmlns:p="http://schemas.microsoft.com/office/2006/metadata/properties" xmlns:ns1="http://schemas.microsoft.com/sharepoint/v3" xmlns:ns2="71af3243-3dd4-4a8d-8c0d-dd76da1f02a5" xmlns:ns3="16c05727-aa75-4e4a-9b5f-8a80a1165891" xmlns:ns4="230e9df3-be65-4c73-a93b-d1236ebd677e" targetNamespace="http://schemas.microsoft.com/office/2006/metadata/properties" ma:root="true" ma:fieldsID="eddc33fff6b14141ee5c74a0d29ea6a1" ns1:_="" ns2:_="" ns3:_="" ns4:_="">
     <xsd:import namespace="http://schemas.microsoft.com/sharepoint/v3"/>
@@ -17174,35 +17133,27 @@
 </ct:contentTypeSchema>
 </file>
 
-<file path=customXml/item2.xml><?xml version="1.0" encoding="utf-8"?>
-<p:properties xmlns:p="http://schemas.microsoft.com/office/2006/metadata/properties" xmlns:xsi="http://www.w3.org/2001/XMLSchema-instance" xmlns:pc="http://schemas.microsoft.com/office/infopath/2007/PartnerControls">
-  <documentManagement>
-    <_ip_UnifiedCompliancePolicyUIAction xmlns="http://schemas.microsoft.com/sharepoint/v3" xsi:nil="true"/>
-    <Image xmlns="71af3243-3dd4-4a8d-8c0d-dd76da1f02a5">
-      <Url xsi:nil="true"/>
-      <Description xsi:nil="true"/>
-    </Image>
-    <Status xmlns="71af3243-3dd4-4a8d-8c0d-dd76da1f02a5">Not started</Status>
-    <_ip_UnifiedCompliancePolicyProperties xmlns="http://schemas.microsoft.com/sharepoint/v3" xsi:nil="true"/>
-    <lcf76f155ced4ddcb4097134ff3c332f xmlns="71af3243-3dd4-4a8d-8c0d-dd76da1f02a5">
-      <Terms xmlns="http://schemas.microsoft.com/office/infopath/2007/PartnerControls"/>
-    </lcf76f155ced4ddcb4097134ff3c332f>
-    <TaxCatchAll xmlns="230e9df3-be65-4c73-a93b-d1236ebd677e"/>
-    <MediaServiceKeyPoints xmlns="71af3243-3dd4-4a8d-8c0d-dd76da1f02a5" xsi:nil="true"/>
-  </documentManagement>
-</p:properties>
+<file path=customXml/itemProps1.xml><?xml version="1.0" encoding="utf-8"?>
+<ds:datastoreItem xmlns:ds="http://schemas.openxmlformats.org/officeDocument/2006/customXml" ds:itemID="{904751AB-E840-446F-8D49-E697067EC887}">
+  <ds:schemaRefs>
+    <ds:schemaRef ds:uri="http://schemas.microsoft.com/sharepoint/v3/contenttype/forms"/>
+  </ds:schemaRefs>
+</ds:datastoreItem>
 </file>
 
-<file path=customXml/item3.xml><?xml version="1.0" encoding="utf-8"?>
-<?mso-contentType ?>
-<FormTemplates xmlns="http://schemas.microsoft.com/sharepoint/v3/contenttype/forms">
-  <Display>DocumentLibraryForm</Display>
-  <Edit>DocumentLibraryForm</Edit>
-  <New>DocumentLibraryForm</New>
-</FormTemplates>
+<file path=customXml/itemProps2.xml><?xml version="1.0" encoding="utf-8"?>
+<ds:datastoreItem xmlns:ds="http://schemas.openxmlformats.org/officeDocument/2006/customXml" ds:itemID="{50811A92-D464-4AC4-A396-BA73B10CEEAC}">
+  <ds:schemaRefs>
+    <ds:schemaRef ds:uri="http://schemas.microsoft.com/office/2006/metadata/properties"/>
+    <ds:schemaRef ds:uri="http://schemas.microsoft.com/office/infopath/2007/PartnerControls"/>
+    <ds:schemaRef ds:uri="http://schemas.microsoft.com/sharepoint/v3"/>
+    <ds:schemaRef ds:uri="71af3243-3dd4-4a8d-8c0d-dd76da1f02a5"/>
+    <ds:schemaRef ds:uri="230e9df3-be65-4c73-a93b-d1236ebd677e"/>
+  </ds:schemaRefs>
+</ds:datastoreItem>
 </file>
 
-<file path=customXml/itemProps1.xml><?xml version="1.0" encoding="utf-8"?>
+<file path=customXml/itemProps3.xml><?xml version="1.0" encoding="utf-8"?>
 <ds:datastoreItem xmlns:ds="http://schemas.openxmlformats.org/officeDocument/2006/customXml" ds:itemID="{DE4876F9-7AE1-498D-B8FE-1E3AD703D2AF}">
   <ds:schemaRefs>
     <ds:schemaRef ds:uri="http://schemas.microsoft.com/office/2006/metadata/contentType"/>
@@ -17223,26 +17174,6 @@
 </ds:datastoreItem>
 </file>
 
-<file path=customXml/itemProps2.xml><?xml version="1.0" encoding="utf-8"?>
-<ds:datastoreItem xmlns:ds="http://schemas.openxmlformats.org/officeDocument/2006/customXml" ds:itemID="{50811A92-D464-4AC4-A396-BA73B10CEEAC}">
-  <ds:schemaRefs>
-    <ds:schemaRef ds:uri="http://schemas.microsoft.com/office/2006/metadata/properties"/>
-    <ds:schemaRef ds:uri="http://schemas.microsoft.com/office/infopath/2007/PartnerControls"/>
-    <ds:schemaRef ds:uri="http://schemas.microsoft.com/sharepoint/v3"/>
-    <ds:schemaRef ds:uri="71af3243-3dd4-4a8d-8c0d-dd76da1f02a5"/>
-    <ds:schemaRef ds:uri="230e9df3-be65-4c73-a93b-d1236ebd677e"/>
-  </ds:schemaRefs>
-</ds:datastoreItem>
-</file>
-
-<file path=customXml/itemProps3.xml><?xml version="1.0" encoding="utf-8"?>
-<ds:datastoreItem xmlns:ds="http://schemas.openxmlformats.org/officeDocument/2006/customXml" ds:itemID="{904751AB-E840-446F-8D49-E697067EC887}">
-  <ds:schemaRefs>
-    <ds:schemaRef ds:uri="http://schemas.microsoft.com/sharepoint/v3/contenttype/forms"/>
-  </ds:schemaRefs>
-</ds:datastoreItem>
-</file>
-
 <file path=docMetadata/LabelInfo.xml><?xml version="1.0" encoding="utf-8"?>
 <clbl:labelList xmlns:clbl="http://schemas.microsoft.com/office/2020/mipLabelMetadata">
   <clbl:label id="{f42aa342-8706-4288-bd11-ebb85995028c}" enabled="1" method="Standard" siteId="{72f988bf-86f1-41af-91ab-2d7cd011db47}" contentBits="0" removed="0"/>

</xml_diff>